<commit_message>
edit hoare.tex, S16 confidence slides
</commit_message>
<xml_diff>
--- a/spring16/slidesS16/confidence-vs-prediction98.pptx
+++ b/spring16/slidesS16/confidence-vs-prediction98.pptx
@@ -2890,7 +2890,7 @@
           <a:graphicData uri="http://schemas.openxmlformats.org/presentationml/2006/ole">
             <mc:AlternateContent xmlns:mc="http://schemas.openxmlformats.org/markup-compatibility/2006">
               <mc:Choice xmlns:v="urn:schemas-microsoft-com:vml" Requires="v">
-                <p:oleObj spid="_x0000_s2066" name="Equation" r:id="rId3" imgW="1549400" imgH="254000" progId="Equation.DSMT4">
+                <p:oleObj spid="_x0000_s2071" name="Equation" r:id="rId3" imgW="1549400" imgH="254000" progId="Equation.DSMT4">
                   <p:embed/>
                 </p:oleObj>
               </mc:Choice>
@@ -2947,7 +2947,7 @@
           <a:graphicData uri="http://schemas.openxmlformats.org/presentationml/2006/ole">
             <mc:AlternateContent xmlns:mc="http://schemas.openxmlformats.org/markup-compatibility/2006">
               <mc:Choice xmlns:v="urn:schemas-microsoft-com:vml" Requires="v">
-                <p:oleObj spid="_x0000_s2067" name="Equation" r:id="rId5" imgW="1447800" imgH="241300" progId="Equation.DSMT4">
+                <p:oleObj spid="_x0000_s2072" name="Equation" r:id="rId5" imgW="1447800" imgH="241300" progId="Equation.DSMT4">
                   <p:embed/>
                 </p:oleObj>
               </mc:Choice>
@@ -3628,7 +3628,7 @@
           <a:graphicData uri="http://schemas.openxmlformats.org/presentationml/2006/ole">
             <mc:AlternateContent xmlns:mc="http://schemas.openxmlformats.org/markup-compatibility/2006">
               <mc:Choice xmlns:v="urn:schemas-microsoft-com:vml" Requires="v">
-                <p:oleObj spid="_x0000_s3088" name="Equation" r:id="rId3" imgW="1879600" imgH="241300" progId="Equation.DSMT4">
+                <p:oleObj spid="_x0000_s3093" name="Equation" r:id="rId3" imgW="1879600" imgH="241300" progId="Equation.DSMT4">
                   <p:embed/>
                 </p:oleObj>
               </mc:Choice>
@@ -3685,7 +3685,7 @@
           <a:graphicData uri="http://schemas.openxmlformats.org/presentationml/2006/ole">
             <mc:AlternateContent xmlns:mc="http://schemas.openxmlformats.org/markup-compatibility/2006">
               <mc:Choice xmlns:v="urn:schemas-microsoft-com:vml" Requires="v">
-                <p:oleObj spid="_x0000_s3089" name="Equation" r:id="rId5" imgW="2159000" imgH="241300" progId="Equation.DSMT4">
+                <p:oleObj spid="_x0000_s3094" name="Equation" r:id="rId5" imgW="2159000" imgH="241300" progId="Equation.DSMT4">
                   <p:embed/>
                 </p:oleObj>
               </mc:Choice>
@@ -3829,6 +3829,67 @@
                                           </p:stCondLst>
                                         </p:cTn>
                                         <p:tgtEl>
+                                          <p:spTgt spid="7">
+                                            <p:txEl>
+                                              <p:pRg st="2" end="2"/>
+                                            </p:txEl>
+                                          </p:spTgt>
+                                        </p:tgtEl>
+                                        <p:attrNameLst>
+                                          <p:attrName>style.visibility</p:attrName>
+                                        </p:attrNameLst>
+                                      </p:cBhvr>
+                                      <p:to>
+                                        <p:strVal val="visible"/>
+                                      </p:to>
+                                    </p:set>
+                                    <p:animEffect transition="in" filter="fade">
+                                      <p:cBhvr>
+                                        <p:cTn id="12" dur="500"/>
+                                        <p:tgtEl>
+                                          <p:spTgt spid="7">
+                                            <p:txEl>
+                                              <p:pRg st="2" end="2"/>
+                                            </p:txEl>
+                                          </p:spTgt>
+                                        </p:tgtEl>
+                                      </p:cBhvr>
+                                    </p:animEffect>
+                                  </p:childTnLst>
+                                </p:cTn>
+                              </p:par>
+                            </p:childTnLst>
+                          </p:cTn>
+                        </p:par>
+                      </p:childTnLst>
+                    </p:cTn>
+                  </p:par>
+                  <p:par>
+                    <p:cTn id="13" fill="hold">
+                      <p:stCondLst>
+                        <p:cond delay="indefinite"/>
+                      </p:stCondLst>
+                      <p:childTnLst>
+                        <p:par>
+                          <p:cTn id="14" fill="hold">
+                            <p:stCondLst>
+                              <p:cond delay="0"/>
+                            </p:stCondLst>
+                            <p:childTnLst>
+                              <p:par>
+                                <p:cTn id="15" presetID="10" presetClass="entr" presetSubtype="0" fill="hold" nodeType="clickEffect">
+                                  <p:stCondLst>
+                                    <p:cond delay="0"/>
+                                  </p:stCondLst>
+                                  <p:childTnLst>
+                                    <p:set>
+                                      <p:cBhvr>
+                                        <p:cTn id="16" dur="1" fill="hold">
+                                          <p:stCondLst>
+                                            <p:cond delay="0"/>
+                                          </p:stCondLst>
+                                        </p:cTn>
+                                        <p:tgtEl>
                                           <p:spTgt spid="9"/>
                                         </p:tgtEl>
                                         <p:attrNameLst>
@@ -3841,7 +3902,7 @@
                                     </p:set>
                                     <p:animEffect transition="in" filter="fade">
                                       <p:cBhvr>
-                                        <p:cTn id="12" dur="500"/>
+                                        <p:cTn id="17" dur="500"/>
                                         <p:tgtEl>
                                           <p:spTgt spid="9"/>
                                         </p:tgtEl>
@@ -3920,13 +3981,38 @@
           <a:p>
             <a:r>
               <a:rPr lang="en-US" sz="4800" dirty="0" smtClean="0"/>
-              <a:t>Do 50 tests with 98% confidence, but only report the one that shows positive.</a:t>
-            </a:r>
-          </a:p>
-          <a:p>
+              <a:t>If you do </a:t>
+            </a:r>
             <a:r>
               <a:rPr lang="en-US" sz="4800" dirty="0" smtClean="0"/>
-              <a:t>Silly to assert confidence in that one report.</a:t>
+              <a:t>50 tests with 98% confidence, but only report the one that shows </a:t>
+            </a:r>
+            <a:r>
+              <a:rPr lang="en-US" sz="4800" dirty="0" smtClean="0"/>
+              <a:t>positive</a:t>
+            </a:r>
+            <a:endParaRPr lang="en-US" sz="4800" dirty="0" smtClean="0"/>
+          </a:p>
+          <a:p>
+            <a:r>
+              <a:rPr lang="en-US" sz="4800" dirty="0"/>
+              <a:t>t</a:t>
+            </a:r>
+            <a:r>
+              <a:rPr lang="en-US" sz="4800" dirty="0" smtClean="0"/>
+              <a:t>hen silly </a:t>
+            </a:r>
+            <a:r>
+              <a:rPr lang="en-US" sz="4800" dirty="0" smtClean="0"/>
+              <a:t>to </a:t>
+            </a:r>
+            <a:r>
+              <a:rPr lang="en-US" sz="4800" dirty="0" smtClean="0"/>
+              <a:t>be confident about </a:t>
+            </a:r>
+            <a:r>
+              <a:rPr lang="en-US" sz="4800" dirty="0" smtClean="0"/>
+              <a:t>that one report.</a:t>
             </a:r>
           </a:p>
           <a:p>
@@ -4228,6 +4314,58 @@
                                         <p:tgtEl>
                                           <p:spTgt spid="3">
                                             <p:txEl>
+                                              <p:pRg st="1" end="1"/>
+                                            </p:txEl>
+                                          </p:spTgt>
+                                        </p:tgtEl>
+                                        <p:attrNameLst>
+                                          <p:attrName>style.visibility</p:attrName>
+                                        </p:attrNameLst>
+                                      </p:cBhvr>
+                                      <p:to>
+                                        <p:strVal val="visible"/>
+                                      </p:to>
+                                    </p:set>
+                                    <p:animEffect transition="in" filter="fade">
+                                      <p:cBhvr>
+                                        <p:cTn id="7" dur="500"/>
+                                        <p:tgtEl>
+                                          <p:spTgt spid="3">
+                                            <p:txEl>
+                                              <p:pRg st="1" end="1"/>
+                                            </p:txEl>
+                                          </p:spTgt>
+                                        </p:tgtEl>
+                                      </p:cBhvr>
+                                    </p:animEffect>
+                                  </p:childTnLst>
+                                </p:cTn>
+                              </p:par>
+                            </p:childTnLst>
+                          </p:cTn>
+                        </p:par>
+                        <p:par>
+                          <p:cTn id="8" fill="hold">
+                            <p:stCondLst>
+                              <p:cond delay="500"/>
+                            </p:stCondLst>
+                            <p:childTnLst>
+                              <p:par>
+                                <p:cTn id="9" presetID="10" presetClass="entr" presetSubtype="0" fill="hold" nodeType="afterEffect">
+                                  <p:stCondLst>
+                                    <p:cond delay="0"/>
+                                  </p:stCondLst>
+                                  <p:childTnLst>
+                                    <p:set>
+                                      <p:cBhvr>
+                                        <p:cTn id="10" dur="1" fill="hold">
+                                          <p:stCondLst>
+                                            <p:cond delay="0"/>
+                                          </p:stCondLst>
+                                        </p:cTn>
+                                        <p:tgtEl>
+                                          <p:spTgt spid="3">
+                                            <p:txEl>
                                               <p:pRg st="2" end="2"/>
                                             </p:txEl>
                                           </p:spTgt>
@@ -4242,7 +4380,7 @@
                                     </p:set>
                                     <p:animEffect transition="in" filter="fade">
                                       <p:cBhvr>
-                                        <p:cTn id="7" dur="500"/>
+                                        <p:cTn id="11" dur="1000"/>
                                         <p:tgtEl>
                                           <p:spTgt spid="3">
                                             <p:txEl>
@@ -7385,7 +7523,17 @@
                 <a:latin typeface="Comic Sans MS"/>
                 <a:cs typeface="Comic Sans MS"/>
               </a:rPr>
-              <a:t>prior correct.</a:t>
+              <a:t>of prior tests correct</a:t>
+            </a:r>
+            <a:r>
+              <a:rPr lang="en-US" sz="4000" dirty="0" smtClean="0">
+                <a:solidFill>
+                  <a:srgbClr val="000000"/>
+                </a:solidFill>
+                <a:latin typeface="Comic Sans MS"/>
+                <a:cs typeface="Comic Sans MS"/>
+              </a:rPr>
+              <a:t>.</a:t>
             </a:r>
           </a:p>
           <a:p>
@@ -7548,33 +7696,15 @@
                                   </p:childTnLst>
                                 </p:cTn>
                               </p:par>
-                            </p:childTnLst>
-                          </p:cTn>
-                        </p:par>
-                      </p:childTnLst>
-                    </p:cTn>
-                  </p:par>
-                  <p:par>
-                    <p:cTn id="8" fill="hold">
-                      <p:stCondLst>
-                        <p:cond delay="indefinite"/>
-                      </p:stCondLst>
-                      <p:childTnLst>
-                        <p:par>
-                          <p:cTn id="9" fill="hold">
-                            <p:stCondLst>
-                              <p:cond delay="0"/>
-                            </p:stCondLst>
-                            <p:childTnLst>
                               <p:par>
-                                <p:cTn id="10" presetID="10" presetClass="entr" presetSubtype="0" fill="hold" nodeType="clickEffect">
+                                <p:cTn id="8" presetID="10" presetClass="entr" presetSubtype="0" fill="hold" nodeType="withEffect">
                                   <p:stCondLst>
                                     <p:cond delay="0"/>
                                   </p:stCondLst>
                                   <p:childTnLst>
                                     <p:set>
                                       <p:cBhvr>
-                                        <p:cTn id="11" dur="1" fill="hold">
+                                        <p:cTn id="9" dur="1" fill="hold">
                                           <p:stCondLst>
                                             <p:cond delay="0"/>
                                           </p:stCondLst>
@@ -7596,7 +7726,7 @@
                                     </p:set>
                                     <p:animEffect transition="in" filter="fade">
                                       <p:cBhvr>
-                                        <p:cTn id="12" dur="500"/>
+                                        <p:cTn id="10" dur="500"/>
                                         <p:tgtEl>
                                           <p:spTgt spid="6">
                                             <p:txEl>
@@ -8235,7 +8365,7 @@
           <a:graphicData uri="http://schemas.openxmlformats.org/presentationml/2006/ole">
             <mc:AlternateContent xmlns:mc="http://schemas.openxmlformats.org/markup-compatibility/2006">
               <mc:Choice xmlns:v="urn:schemas-microsoft-com:vml" Requires="v">
-                <p:oleObj spid="_x0000_s1057" name="Equation" r:id="rId3" imgW="1651000" imgH="241300" progId="Equation.DSMT4">
+                <p:oleObj spid="_x0000_s1060" name="Equation" r:id="rId3" imgW="1651000" imgH="241300" progId="Equation.DSMT4">
                   <p:embed/>
                 </p:oleObj>
               </mc:Choice>

</xml_diff>